<commit_message>
chore(introduction): update architechture overview
related to #CAM-4807
</commit_message>
<xml_diff>
--- a/develop/drawings/Technical Architecture.pptx
+++ b/develop/drawings/Technical Architecture.pptx
@@ -8,7 +8,7 @@
     <p:notesMasterId r:id="rId3"/>
   </p:notesMasterIdLst>
   <p:sldIdLst>
-    <p:sldId id="258" r:id="rId2"/>
+    <p:sldId id="259" r:id="rId2"/>
   </p:sldIdLst>
   <p:sldSz cx="12192000" cy="6858000"/>
   <p:notesSz cx="6858000" cy="9144000"/>
@@ -197,7 +197,7 @@
           <a:p>
             <a:fld id="{88C8F7A0-0734-47F9-878F-A05A3F97477E}" type="datetimeFigureOut">
               <a:rPr lang="de-DE" smtClean="0"/>
-              <a:t>24.06.2015</a:t>
+              <a:t>23.10.2015</a:t>
             </a:fld>
             <a:endParaRPr lang="de-DE"/>
           </a:p>
@@ -510,22 +510,320 @@
           <a:lstStyle/>
           <a:p>
             <a:r>
-              <a:rPr lang="de-DE" smtClean="0"/>
-              <a:t>So we added CMMN support to</a:t>
-            </a:r>
-            <a:r>
-              <a:rPr lang="de-DE" baseline="0" smtClean="0"/>
-              <a:t> the </a:t>
-            </a:r>
-            <a:r>
-              <a:rPr lang="de-DE" smtClean="0"/>
-              <a:t>Camunda platform, which means</a:t>
-            </a:r>
-            <a:r>
-              <a:rPr lang="de-DE" baseline="0" smtClean="0"/>
-              <a:t> you have an integrated Java and REST API for handling both standards. We released it end of November, and right now we are seeing it being adapted by our community. </a:t>
-            </a:r>
-            <a:endParaRPr lang="de-DE"/>
+              <a:rPr lang="de-DE" dirty="0" smtClean="0"/>
+              <a:t>Talk </a:t>
+            </a:r>
+            <a:r>
+              <a:rPr lang="de-DE" dirty="0" err="1" smtClean="0"/>
+              <a:t>about</a:t>
+            </a:r>
+            <a:r>
+              <a:rPr lang="de-DE" dirty="0" smtClean="0"/>
+              <a:t> </a:t>
+            </a:r>
+            <a:r>
+              <a:rPr lang="de-DE" dirty="0" err="1" smtClean="0"/>
+              <a:t>blue</a:t>
+            </a:r>
+            <a:r>
+              <a:rPr lang="de-DE" baseline="0" dirty="0" smtClean="0"/>
+              <a:t> </a:t>
+            </a:r>
+            <a:r>
+              <a:rPr lang="de-DE" baseline="0" dirty="0" err="1" smtClean="0"/>
+              <a:t>boardered</a:t>
+            </a:r>
+            <a:r>
+              <a:rPr lang="de-DE" baseline="0" dirty="0" smtClean="0"/>
+              <a:t> </a:t>
+            </a:r>
+            <a:r>
+              <a:rPr lang="de-DE" baseline="0" dirty="0" err="1" smtClean="0"/>
+              <a:t>tasks</a:t>
+            </a:r>
+            <a:r>
+              <a:rPr lang="de-DE" baseline="0" dirty="0" smtClean="0"/>
+              <a:t> </a:t>
+            </a:r>
+            <a:r>
+              <a:rPr lang="de-DE" baseline="0" dirty="0" err="1" smtClean="0"/>
+              <a:t>here</a:t>
+            </a:r>
+            <a:r>
+              <a:rPr lang="de-DE" baseline="0" dirty="0" smtClean="0"/>
+              <a:t>. </a:t>
+            </a:r>
+            <a:endParaRPr lang="de-DE" dirty="0" smtClean="0"/>
+          </a:p>
+          <a:p>
+            <a:endParaRPr lang="de-DE" dirty="0" smtClean="0"/>
+          </a:p>
+          <a:p>
+            <a:r>
+              <a:rPr lang="de-DE" dirty="0" smtClean="0"/>
+              <a:t>So </a:t>
+            </a:r>
+            <a:r>
+              <a:rPr lang="de-DE" dirty="0" err="1" smtClean="0"/>
+              <a:t>we</a:t>
+            </a:r>
+            <a:r>
+              <a:rPr lang="de-DE" dirty="0" smtClean="0"/>
+              <a:t> </a:t>
+            </a:r>
+            <a:r>
+              <a:rPr lang="de-DE" dirty="0" err="1" smtClean="0"/>
+              <a:t>added</a:t>
+            </a:r>
+            <a:r>
+              <a:rPr lang="de-DE" dirty="0" smtClean="0"/>
+              <a:t> CMMN </a:t>
+            </a:r>
+            <a:r>
+              <a:rPr lang="de-DE" dirty="0" err="1" smtClean="0"/>
+              <a:t>support</a:t>
+            </a:r>
+            <a:r>
+              <a:rPr lang="de-DE" dirty="0" smtClean="0"/>
+              <a:t> </a:t>
+            </a:r>
+            <a:r>
+              <a:rPr lang="de-DE" dirty="0" err="1" smtClean="0"/>
+              <a:t>to</a:t>
+            </a:r>
+            <a:r>
+              <a:rPr lang="de-DE" baseline="0" dirty="0" smtClean="0"/>
+              <a:t> </a:t>
+            </a:r>
+            <a:r>
+              <a:rPr lang="de-DE" baseline="0" dirty="0" err="1" smtClean="0"/>
+              <a:t>the</a:t>
+            </a:r>
+            <a:r>
+              <a:rPr lang="de-DE" baseline="0" dirty="0" smtClean="0"/>
+              <a:t> </a:t>
+            </a:r>
+            <a:r>
+              <a:rPr lang="de-DE" dirty="0" smtClean="0"/>
+              <a:t>Camunda </a:t>
+            </a:r>
+            <a:r>
+              <a:rPr lang="de-DE" dirty="0" err="1" smtClean="0"/>
+              <a:t>platform</a:t>
+            </a:r>
+            <a:r>
+              <a:rPr lang="de-DE" dirty="0" smtClean="0"/>
+              <a:t>, </a:t>
+            </a:r>
+            <a:r>
+              <a:rPr lang="de-DE" dirty="0" err="1" smtClean="0"/>
+              <a:t>which</a:t>
+            </a:r>
+            <a:r>
+              <a:rPr lang="de-DE" dirty="0" smtClean="0"/>
+              <a:t> </a:t>
+            </a:r>
+            <a:r>
+              <a:rPr lang="de-DE" dirty="0" err="1" smtClean="0"/>
+              <a:t>means</a:t>
+            </a:r>
+            <a:r>
+              <a:rPr lang="de-DE" baseline="0" dirty="0" smtClean="0"/>
+              <a:t> </a:t>
+            </a:r>
+            <a:r>
+              <a:rPr lang="de-DE" baseline="0" dirty="0" err="1" smtClean="0"/>
+              <a:t>you</a:t>
+            </a:r>
+            <a:r>
+              <a:rPr lang="de-DE" baseline="0" dirty="0" smtClean="0"/>
+              <a:t> </a:t>
+            </a:r>
+            <a:r>
+              <a:rPr lang="de-DE" baseline="0" dirty="0" err="1" smtClean="0"/>
+              <a:t>have</a:t>
+            </a:r>
+            <a:r>
+              <a:rPr lang="de-DE" baseline="0" dirty="0" smtClean="0"/>
+              <a:t> an </a:t>
+            </a:r>
+            <a:r>
+              <a:rPr lang="de-DE" baseline="0" dirty="0" err="1" smtClean="0"/>
+              <a:t>integrated</a:t>
+            </a:r>
+            <a:r>
+              <a:rPr lang="de-DE" baseline="0" dirty="0" smtClean="0"/>
+              <a:t> Java </a:t>
+            </a:r>
+            <a:r>
+              <a:rPr lang="de-DE" baseline="0" dirty="0" err="1" smtClean="0"/>
+              <a:t>and</a:t>
+            </a:r>
+            <a:r>
+              <a:rPr lang="de-DE" baseline="0" dirty="0" smtClean="0"/>
+              <a:t> REST API </a:t>
+            </a:r>
+            <a:r>
+              <a:rPr lang="de-DE" baseline="0" dirty="0" err="1" smtClean="0"/>
+              <a:t>for</a:t>
+            </a:r>
+            <a:r>
+              <a:rPr lang="de-DE" baseline="0" dirty="0" smtClean="0"/>
+              <a:t> </a:t>
+            </a:r>
+            <a:r>
+              <a:rPr lang="de-DE" baseline="0" dirty="0" err="1" smtClean="0"/>
+              <a:t>handling</a:t>
+            </a:r>
+            <a:r>
+              <a:rPr lang="de-DE" baseline="0" dirty="0" smtClean="0"/>
+              <a:t> </a:t>
+            </a:r>
+            <a:r>
+              <a:rPr lang="de-DE" baseline="0" dirty="0" err="1" smtClean="0"/>
+              <a:t>both</a:t>
+            </a:r>
+            <a:r>
+              <a:rPr lang="de-DE" baseline="0" dirty="0" smtClean="0"/>
+              <a:t> </a:t>
+            </a:r>
+            <a:r>
+              <a:rPr lang="de-DE" baseline="0" dirty="0" err="1" smtClean="0"/>
+              <a:t>standards</a:t>
+            </a:r>
+            <a:r>
+              <a:rPr lang="de-DE" baseline="0" dirty="0" smtClean="0"/>
+              <a:t>. </a:t>
+            </a:r>
+            <a:r>
+              <a:rPr lang="de-DE" baseline="0" dirty="0" err="1" smtClean="0"/>
+              <a:t>We</a:t>
+            </a:r>
+            <a:r>
+              <a:rPr lang="de-DE" baseline="0" dirty="0" smtClean="0"/>
+              <a:t> </a:t>
+            </a:r>
+            <a:r>
+              <a:rPr lang="de-DE" baseline="0" dirty="0" err="1" smtClean="0"/>
+              <a:t>released</a:t>
+            </a:r>
+            <a:r>
+              <a:rPr lang="de-DE" baseline="0" dirty="0" smtClean="0"/>
+              <a:t> </a:t>
+            </a:r>
+            <a:r>
+              <a:rPr lang="de-DE" baseline="0" dirty="0" err="1" smtClean="0"/>
+              <a:t>it</a:t>
+            </a:r>
+            <a:r>
+              <a:rPr lang="de-DE" baseline="0" dirty="0" smtClean="0"/>
+              <a:t> end </a:t>
+            </a:r>
+            <a:r>
+              <a:rPr lang="de-DE" baseline="0" dirty="0" err="1" smtClean="0"/>
+              <a:t>of</a:t>
+            </a:r>
+            <a:r>
+              <a:rPr lang="de-DE" baseline="0" dirty="0" smtClean="0"/>
+              <a:t> November, </a:t>
+            </a:r>
+            <a:r>
+              <a:rPr lang="de-DE" baseline="0" dirty="0" err="1" smtClean="0"/>
+              <a:t>and</a:t>
+            </a:r>
+            <a:r>
+              <a:rPr lang="de-DE" baseline="0" dirty="0" smtClean="0"/>
+              <a:t> </a:t>
+            </a:r>
+            <a:r>
+              <a:rPr lang="de-DE" baseline="0" dirty="0" err="1" smtClean="0"/>
+              <a:t>right</a:t>
+            </a:r>
+            <a:r>
+              <a:rPr lang="de-DE" baseline="0" dirty="0" smtClean="0"/>
+              <a:t> </a:t>
+            </a:r>
+            <a:r>
+              <a:rPr lang="de-DE" baseline="0" dirty="0" err="1" smtClean="0"/>
+              <a:t>now</a:t>
+            </a:r>
+            <a:r>
+              <a:rPr lang="de-DE" baseline="0" dirty="0" smtClean="0"/>
+              <a:t> </a:t>
+            </a:r>
+            <a:r>
+              <a:rPr lang="de-DE" baseline="0" dirty="0" err="1" smtClean="0"/>
+              <a:t>we</a:t>
+            </a:r>
+            <a:r>
+              <a:rPr lang="de-DE" baseline="0" dirty="0" smtClean="0"/>
+              <a:t> </a:t>
+            </a:r>
+            <a:r>
+              <a:rPr lang="de-DE" baseline="0" dirty="0" err="1" smtClean="0"/>
+              <a:t>are</a:t>
+            </a:r>
+            <a:r>
+              <a:rPr lang="de-DE" baseline="0" dirty="0" smtClean="0"/>
+              <a:t> </a:t>
+            </a:r>
+            <a:r>
+              <a:rPr lang="de-DE" baseline="0" dirty="0" err="1" smtClean="0"/>
+              <a:t>seeing</a:t>
+            </a:r>
+            <a:r>
+              <a:rPr lang="de-DE" baseline="0" dirty="0" smtClean="0"/>
+              <a:t> </a:t>
+            </a:r>
+            <a:r>
+              <a:rPr lang="de-DE" baseline="0" dirty="0" err="1" smtClean="0"/>
+              <a:t>it</a:t>
+            </a:r>
+            <a:r>
+              <a:rPr lang="de-DE" baseline="0" dirty="0" smtClean="0"/>
+              <a:t> </a:t>
+            </a:r>
+            <a:r>
+              <a:rPr lang="de-DE" baseline="0" dirty="0" err="1" smtClean="0"/>
+              <a:t>being</a:t>
+            </a:r>
+            <a:r>
+              <a:rPr lang="de-DE" baseline="0" dirty="0" smtClean="0"/>
+              <a:t> </a:t>
+            </a:r>
+            <a:r>
+              <a:rPr lang="de-DE" baseline="0" dirty="0" err="1" smtClean="0"/>
+              <a:t>adapted</a:t>
+            </a:r>
+            <a:r>
+              <a:rPr lang="de-DE" baseline="0" dirty="0" smtClean="0"/>
+              <a:t> </a:t>
+            </a:r>
+            <a:r>
+              <a:rPr lang="de-DE" baseline="0" dirty="0" err="1" smtClean="0"/>
+              <a:t>by</a:t>
+            </a:r>
+            <a:r>
+              <a:rPr lang="de-DE" baseline="0" dirty="0" smtClean="0"/>
+              <a:t> </a:t>
+            </a:r>
+            <a:r>
+              <a:rPr lang="de-DE" baseline="0" dirty="0" err="1" smtClean="0"/>
+              <a:t>our</a:t>
+            </a:r>
+            <a:r>
+              <a:rPr lang="de-DE" baseline="0" dirty="0" smtClean="0"/>
+              <a:t> </a:t>
+            </a:r>
+            <a:r>
+              <a:rPr lang="de-DE" baseline="0" dirty="0" err="1" smtClean="0"/>
+              <a:t>community</a:t>
+            </a:r>
+            <a:r>
+              <a:rPr lang="de-DE" baseline="0" dirty="0" smtClean="0"/>
+              <a:t>. </a:t>
+            </a:r>
+            <a:endParaRPr lang="de-DE" dirty="0"/>
           </a:p>
         </p:txBody>
       </p:sp>
@@ -555,7 +853,7 @@
     </p:spTree>
     <p:extLst>
       <p:ext uri="{BB962C8B-B14F-4D97-AF65-F5344CB8AC3E}">
-        <p14:creationId xmlns:p14="http://schemas.microsoft.com/office/powerpoint/2010/main" val="1708360320"/>
+        <p14:creationId xmlns:p14="http://schemas.microsoft.com/office/powerpoint/2010/main" val="3938885919"/>
       </p:ext>
     </p:extLst>
   </p:cSld>
@@ -696,7 +994,7 @@
           <a:p>
             <a:fld id="{2DEAC6C7-5AA7-4FB2-820E-3D9BE8CB6A67}" type="datetimeFigureOut">
               <a:rPr lang="de-DE" smtClean="0"/>
-              <a:t>24.06.2015</a:t>
+              <a:t>23.10.2015</a:t>
             </a:fld>
             <a:endParaRPr lang="de-DE"/>
           </a:p>
@@ -866,7 +1164,7 @@
           <a:p>
             <a:fld id="{2DEAC6C7-5AA7-4FB2-820E-3D9BE8CB6A67}" type="datetimeFigureOut">
               <a:rPr lang="de-DE" smtClean="0"/>
-              <a:t>24.06.2015</a:t>
+              <a:t>23.10.2015</a:t>
             </a:fld>
             <a:endParaRPr lang="de-DE"/>
           </a:p>
@@ -1046,7 +1344,7 @@
           <a:p>
             <a:fld id="{2DEAC6C7-5AA7-4FB2-820E-3D9BE8CB6A67}" type="datetimeFigureOut">
               <a:rPr lang="de-DE" smtClean="0"/>
-              <a:t>24.06.2015</a:t>
+              <a:t>23.10.2015</a:t>
             </a:fld>
             <a:endParaRPr lang="de-DE"/>
           </a:p>
@@ -1216,7 +1514,7 @@
           <a:p>
             <a:fld id="{2DEAC6C7-5AA7-4FB2-820E-3D9BE8CB6A67}" type="datetimeFigureOut">
               <a:rPr lang="de-DE" smtClean="0"/>
-              <a:t>24.06.2015</a:t>
+              <a:t>23.10.2015</a:t>
             </a:fld>
             <a:endParaRPr lang="de-DE"/>
           </a:p>
@@ -1462,7 +1760,7 @@
           <a:p>
             <a:fld id="{2DEAC6C7-5AA7-4FB2-820E-3D9BE8CB6A67}" type="datetimeFigureOut">
               <a:rPr lang="de-DE" smtClean="0"/>
-              <a:t>24.06.2015</a:t>
+              <a:t>23.10.2015</a:t>
             </a:fld>
             <a:endParaRPr lang="de-DE"/>
           </a:p>
@@ -1694,7 +1992,7 @@
           <a:p>
             <a:fld id="{2DEAC6C7-5AA7-4FB2-820E-3D9BE8CB6A67}" type="datetimeFigureOut">
               <a:rPr lang="de-DE" smtClean="0"/>
-              <a:t>24.06.2015</a:t>
+              <a:t>23.10.2015</a:t>
             </a:fld>
             <a:endParaRPr lang="de-DE"/>
           </a:p>
@@ -2061,7 +2359,7 @@
           <a:p>
             <a:fld id="{2DEAC6C7-5AA7-4FB2-820E-3D9BE8CB6A67}" type="datetimeFigureOut">
               <a:rPr lang="de-DE" smtClean="0"/>
-              <a:t>24.06.2015</a:t>
+              <a:t>23.10.2015</a:t>
             </a:fld>
             <a:endParaRPr lang="de-DE"/>
           </a:p>
@@ -2179,7 +2477,7 @@
           <a:p>
             <a:fld id="{2DEAC6C7-5AA7-4FB2-820E-3D9BE8CB6A67}" type="datetimeFigureOut">
               <a:rPr lang="de-DE" smtClean="0"/>
-              <a:t>24.06.2015</a:t>
+              <a:t>23.10.2015</a:t>
             </a:fld>
             <a:endParaRPr lang="de-DE"/>
           </a:p>
@@ -2274,7 +2572,7 @@
           <a:p>
             <a:fld id="{2DEAC6C7-5AA7-4FB2-820E-3D9BE8CB6A67}" type="datetimeFigureOut">
               <a:rPr lang="de-DE" smtClean="0"/>
-              <a:t>24.06.2015</a:t>
+              <a:t>23.10.2015</a:t>
             </a:fld>
             <a:endParaRPr lang="de-DE"/>
           </a:p>
@@ -2551,7 +2849,7 @@
           <a:p>
             <a:fld id="{2DEAC6C7-5AA7-4FB2-820E-3D9BE8CB6A67}" type="datetimeFigureOut">
               <a:rPr lang="de-DE" smtClean="0"/>
-              <a:t>24.06.2015</a:t>
+              <a:t>23.10.2015</a:t>
             </a:fld>
             <a:endParaRPr lang="de-DE"/>
           </a:p>
@@ -2804,7 +3102,7 @@
           <a:p>
             <a:fld id="{2DEAC6C7-5AA7-4FB2-820E-3D9BE8CB6A67}" type="datetimeFigureOut">
               <a:rPr lang="de-DE" smtClean="0"/>
-              <a:t>24.06.2015</a:t>
+              <a:t>23.10.2015</a:t>
             </a:fld>
             <a:endParaRPr lang="de-DE"/>
           </a:p>
@@ -3017,7 +3315,7 @@
           <a:p>
             <a:fld id="{2DEAC6C7-5AA7-4FB2-820E-3D9BE8CB6A67}" type="datetimeFigureOut">
               <a:rPr lang="de-DE" smtClean="0"/>
-              <a:t>24.06.2015</a:t>
+              <a:t>23.10.2015</a:t>
             </a:fld>
             <a:endParaRPr lang="de-DE"/>
           </a:p>
@@ -3424,14 +3722,454 @@
       </p:grpSpPr>
       <p:sp>
         <p:nvSpPr>
-          <p:cNvPr id="45" name="Flussdiagramm: Magnetplattenspeicher 44"/>
+          <p:cNvPr id="3" name="Flussdiagramm: Prozess 2"/>
           <p:cNvSpPr/>
           <p:nvPr/>
         </p:nvSpPr>
         <p:spPr bwMode="auto">
           <a:xfrm>
-            <a:off x="1995605" y="4110015"/>
-            <a:ext cx="1530309" cy="667942"/>
+            <a:off x="4776983" y="4139936"/>
+            <a:ext cx="2063763" cy="720080"/>
+          </a:xfrm>
+          <a:prstGeom prst="flowChartProcess">
+            <a:avLst/>
+          </a:prstGeom>
+          <a:ln>
+            <a:headEnd type="none" w="med" len="med"/>
+            <a:tailEnd type="none" w="med" len="med"/>
+          </a:ln>
+        </p:spPr>
+        <p:style>
+          <a:lnRef idx="2">
+            <a:schemeClr val="accent1"/>
+          </a:lnRef>
+          <a:fillRef idx="1">
+            <a:schemeClr val="lt1"/>
+          </a:fillRef>
+          <a:effectRef idx="0">
+            <a:schemeClr val="accent1"/>
+          </a:effectRef>
+          <a:fontRef idx="minor">
+            <a:schemeClr val="dk1"/>
+          </a:fontRef>
+        </p:style>
+        <p:txBody>
+          <a:bodyPr vert="horz" wrap="square" lIns="72000" tIns="46800" rIns="72000" bIns="46800" numCol="1" rtlCol="0" anchor="ctr" anchorCtr="0" compatLnSpc="1">
+            <a:prstTxWarp prst="textNoShape">
+              <a:avLst/>
+            </a:prstTxWarp>
+          </a:bodyPr>
+          <a:lstStyle/>
+          <a:p>
+            <a:pPr algn="ctr"/>
+            <a:r>
+              <a:rPr lang="de-DE" smtClean="0">
+                <a:solidFill>
+                  <a:schemeClr val="tx1"/>
+                </a:solidFill>
+              </a:rPr>
+              <a:t>Engine </a:t>
+            </a:r>
+          </a:p>
+          <a:p>
+            <a:pPr algn="ctr"/>
+            <a:r>
+              <a:rPr lang="de-DE" sz="1600" smtClean="0">
+                <a:solidFill>
+                  <a:schemeClr val="tx1"/>
+                </a:solidFill>
+              </a:rPr>
+              <a:t>(BPMN, CMMN, DMN)</a:t>
+            </a:r>
+            <a:endParaRPr lang="de-DE" sz="1600" dirty="0" err="1">
+              <a:solidFill>
+                <a:schemeClr val="tx1"/>
+              </a:solidFill>
+            </a:endParaRPr>
+          </a:p>
+        </p:txBody>
+      </p:sp>
+      <p:sp>
+        <p:nvSpPr>
+          <p:cNvPr id="4" name="Flussdiagramm: Prozess 3"/>
+          <p:cNvSpPr/>
+          <p:nvPr/>
+        </p:nvSpPr>
+        <p:spPr bwMode="auto">
+          <a:xfrm>
+            <a:off x="3852974" y="2195720"/>
+            <a:ext cx="1584176" cy="720080"/>
+          </a:xfrm>
+          <a:prstGeom prst="flowChartProcess">
+            <a:avLst/>
+          </a:prstGeom>
+          <a:ln>
+            <a:headEnd type="none" w="med" len="med"/>
+            <a:tailEnd type="none" w="med" len="med"/>
+          </a:ln>
+        </p:spPr>
+        <p:style>
+          <a:lnRef idx="2">
+            <a:schemeClr val="accent1"/>
+          </a:lnRef>
+          <a:fillRef idx="1">
+            <a:schemeClr val="lt1"/>
+          </a:fillRef>
+          <a:effectRef idx="0">
+            <a:schemeClr val="accent1"/>
+          </a:effectRef>
+          <a:fontRef idx="minor">
+            <a:schemeClr val="dk1"/>
+          </a:fontRef>
+        </p:style>
+        <p:txBody>
+          <a:bodyPr vert="horz" wrap="square" lIns="72000" tIns="46800" rIns="72000" bIns="46800" numCol="1" rtlCol="0" anchor="ctr" anchorCtr="0" compatLnSpc="1">
+            <a:prstTxWarp prst="textNoShape">
+              <a:avLst/>
+            </a:prstTxWarp>
+          </a:bodyPr>
+          <a:lstStyle/>
+          <a:p>
+            <a:pPr algn="ctr"/>
+            <a:r>
+              <a:rPr lang="de-DE">
+                <a:solidFill>
+                  <a:schemeClr val="tx1"/>
+                </a:solidFill>
+              </a:rPr>
+              <a:t>Tasklist</a:t>
+            </a:r>
+            <a:endParaRPr lang="de-DE" dirty="0" err="1">
+              <a:solidFill>
+                <a:schemeClr val="tx1"/>
+              </a:solidFill>
+            </a:endParaRPr>
+          </a:p>
+        </p:txBody>
+      </p:sp>
+      <p:sp>
+        <p:nvSpPr>
+          <p:cNvPr id="5" name="Flussdiagramm: Prozess 4"/>
+          <p:cNvSpPr/>
+          <p:nvPr/>
+        </p:nvSpPr>
+        <p:spPr bwMode="auto">
+          <a:xfrm>
+            <a:off x="5641080" y="2195720"/>
+            <a:ext cx="1584176" cy="720080"/>
+          </a:xfrm>
+          <a:prstGeom prst="flowChartProcess">
+            <a:avLst/>
+          </a:prstGeom>
+          <a:solidFill>
+            <a:schemeClr val="bg1"/>
+          </a:solidFill>
+          <a:ln w="9525" cap="flat" cmpd="sng" algn="ctr">
+            <a:solidFill>
+              <a:schemeClr val="tx1"/>
+            </a:solidFill>
+            <a:prstDash val="dash"/>
+            <a:round/>
+            <a:headEnd type="none" w="med" len="med"/>
+            <a:tailEnd type="none" w="med" len="med"/>
+          </a:ln>
+          <a:effectLst/>
+        </p:spPr>
+        <p:txBody>
+          <a:bodyPr vert="horz" wrap="square" lIns="72000" tIns="46800" rIns="72000" bIns="46800" numCol="1" rtlCol="0" anchor="ctr" anchorCtr="0" compatLnSpc="1">
+            <a:prstTxWarp prst="textNoShape">
+              <a:avLst/>
+            </a:prstTxWarp>
+          </a:bodyPr>
+          <a:lstStyle/>
+          <a:p>
+            <a:pPr algn="ctr"/>
+            <a:r>
+              <a:rPr lang="de-DE">
+                <a:latin typeface="+mn-lt"/>
+              </a:rPr>
+              <a:t>Custom</a:t>
+            </a:r>
+          </a:p>
+          <a:p>
+            <a:pPr algn="ctr"/>
+            <a:r>
+              <a:rPr lang="de-DE">
+                <a:latin typeface="+mn-lt"/>
+              </a:rPr>
+              <a:t>Application</a:t>
+            </a:r>
+            <a:endParaRPr lang="de-DE" dirty="0" err="1">
+              <a:latin typeface="+mn-lt"/>
+            </a:endParaRPr>
+          </a:p>
+        </p:txBody>
+      </p:sp>
+      <p:sp>
+        <p:nvSpPr>
+          <p:cNvPr id="6" name="Flussdiagramm: Prozess 5"/>
+          <p:cNvSpPr/>
+          <p:nvPr/>
+        </p:nvSpPr>
+        <p:spPr bwMode="auto">
+          <a:xfrm>
+            <a:off x="7585296" y="2186395"/>
+            <a:ext cx="1584176" cy="720080"/>
+          </a:xfrm>
+          <a:prstGeom prst="flowChartProcess">
+            <a:avLst/>
+          </a:prstGeom>
+          <a:ln>
+            <a:headEnd type="none" w="med" len="med"/>
+            <a:tailEnd type="none" w="med" len="med"/>
+          </a:ln>
+        </p:spPr>
+        <p:style>
+          <a:lnRef idx="2">
+            <a:schemeClr val="accent1"/>
+          </a:lnRef>
+          <a:fillRef idx="1">
+            <a:schemeClr val="lt1"/>
+          </a:fillRef>
+          <a:effectRef idx="0">
+            <a:schemeClr val="accent1"/>
+          </a:effectRef>
+          <a:fontRef idx="minor">
+            <a:schemeClr val="dk1"/>
+          </a:fontRef>
+        </p:style>
+        <p:txBody>
+          <a:bodyPr vert="horz" wrap="square" lIns="72000" tIns="46800" rIns="72000" bIns="46800" numCol="1" rtlCol="0" anchor="ctr" anchorCtr="0" compatLnSpc="1">
+            <a:prstTxWarp prst="textNoShape">
+              <a:avLst/>
+            </a:prstTxWarp>
+          </a:bodyPr>
+          <a:lstStyle/>
+          <a:p>
+            <a:pPr algn="ctr"/>
+            <a:r>
+              <a:rPr lang="de-DE">
+                <a:solidFill>
+                  <a:schemeClr val="tx1"/>
+                </a:solidFill>
+              </a:rPr>
+              <a:t>Cockpit</a:t>
+            </a:r>
+            <a:endParaRPr lang="de-DE" dirty="0" err="1">
+              <a:solidFill>
+                <a:schemeClr val="tx1"/>
+              </a:solidFill>
+            </a:endParaRPr>
+          </a:p>
+        </p:txBody>
+      </p:sp>
+      <p:sp>
+        <p:nvSpPr>
+          <p:cNvPr id="8" name="Flussdiagramm: Prozess 7"/>
+          <p:cNvSpPr/>
+          <p:nvPr/>
+        </p:nvSpPr>
+        <p:spPr bwMode="auto">
+          <a:xfrm>
+            <a:off x="1932731" y="2186395"/>
+            <a:ext cx="1584176" cy="726704"/>
+          </a:xfrm>
+          <a:prstGeom prst="flowChartProcess">
+            <a:avLst/>
+          </a:prstGeom>
+          <a:ln>
+            <a:headEnd type="none" w="med" len="med"/>
+            <a:tailEnd type="none" w="med" len="med"/>
+          </a:ln>
+        </p:spPr>
+        <p:style>
+          <a:lnRef idx="2">
+            <a:schemeClr val="accent1"/>
+          </a:lnRef>
+          <a:fillRef idx="1">
+            <a:schemeClr val="lt1"/>
+          </a:fillRef>
+          <a:effectRef idx="0">
+            <a:schemeClr val="accent1"/>
+          </a:effectRef>
+          <a:fontRef idx="minor">
+            <a:schemeClr val="dk1"/>
+          </a:fontRef>
+        </p:style>
+        <p:txBody>
+          <a:bodyPr vert="horz" wrap="square" lIns="72000" tIns="46800" rIns="72000" bIns="46800" numCol="1" rtlCol="0" anchor="ctr" anchorCtr="0" compatLnSpc="1">
+            <a:prstTxWarp prst="textNoShape">
+              <a:avLst/>
+            </a:prstTxWarp>
+          </a:bodyPr>
+          <a:lstStyle/>
+          <a:p>
+            <a:pPr algn="ctr"/>
+            <a:r>
+              <a:rPr lang="de-DE" smtClean="0">
+                <a:solidFill>
+                  <a:schemeClr val="tx1"/>
+                </a:solidFill>
+              </a:rPr>
+              <a:t>Modeler</a:t>
+            </a:r>
+            <a:endParaRPr lang="de-DE" dirty="0" err="1">
+              <a:solidFill>
+                <a:schemeClr val="tx1"/>
+              </a:solidFill>
+            </a:endParaRPr>
+          </a:p>
+        </p:txBody>
+      </p:sp>
+      <p:sp>
+        <p:nvSpPr>
+          <p:cNvPr id="10" name="Textfeld 9"/>
+          <p:cNvSpPr txBox="1"/>
+          <p:nvPr/>
+        </p:nvSpPr>
+        <p:spPr>
+          <a:xfrm>
+            <a:off x="5013487" y="1485697"/>
+            <a:ext cx="986983" cy="369332"/>
+          </a:xfrm>
+          <a:prstGeom prst="rect">
+            <a:avLst/>
+          </a:prstGeom>
+          <a:noFill/>
+        </p:spPr>
+        <p:txBody>
+          <a:bodyPr wrap="none" lIns="72000" rIns="72000" rtlCol="0">
+            <a:spAutoFit/>
+          </a:bodyPr>
+          <a:lstStyle/>
+          <a:p>
+            <a:r>
+              <a:rPr lang="de-DE" smtClean="0">
+                <a:latin typeface="+mn-lt"/>
+              </a:rPr>
+              <a:t>End User</a:t>
+            </a:r>
+            <a:endParaRPr lang="de-DE" dirty="0" err="1">
+              <a:latin typeface="+mn-lt"/>
+            </a:endParaRPr>
+          </a:p>
+        </p:txBody>
+      </p:sp>
+      <p:sp>
+        <p:nvSpPr>
+          <p:cNvPr id="11" name="Textfeld 10"/>
+          <p:cNvSpPr txBox="1"/>
+          <p:nvPr/>
+        </p:nvSpPr>
+        <p:spPr>
+          <a:xfrm>
+            <a:off x="6997252" y="1209402"/>
+            <a:ext cx="2760263" cy="646331"/>
+          </a:xfrm>
+          <a:prstGeom prst="rect">
+            <a:avLst/>
+          </a:prstGeom>
+          <a:noFill/>
+        </p:spPr>
+        <p:txBody>
+          <a:bodyPr wrap="square" lIns="72000" rIns="72000" rtlCol="0">
+            <a:spAutoFit/>
+          </a:bodyPr>
+          <a:lstStyle/>
+          <a:p>
+            <a:pPr algn="ctr"/>
+            <a:r>
+              <a:rPr lang="de-DE" smtClean="0">
+                <a:latin typeface="+mn-lt"/>
+              </a:rPr>
+              <a:t>Operator</a:t>
+            </a:r>
+            <a:endParaRPr lang="de-DE">
+              <a:latin typeface="+mn-lt"/>
+            </a:endParaRPr>
+          </a:p>
+          <a:p>
+            <a:pPr algn="ctr"/>
+            <a:r>
+              <a:rPr lang="de-DE">
+                <a:latin typeface="+mn-lt"/>
+              </a:rPr>
+              <a:t>(</a:t>
+            </a:r>
+            <a:r>
+              <a:rPr lang="de-DE" smtClean="0">
+                <a:latin typeface="+mn-lt"/>
+              </a:rPr>
+              <a:t>technical/business</a:t>
+            </a:r>
+            <a:r>
+              <a:rPr lang="de-DE">
+                <a:latin typeface="+mn-lt"/>
+              </a:rPr>
+              <a:t>)</a:t>
+            </a:r>
+            <a:endParaRPr lang="de-DE" dirty="0" err="1">
+              <a:latin typeface="+mn-lt"/>
+            </a:endParaRPr>
+          </a:p>
+        </p:txBody>
+      </p:sp>
+      <p:sp>
+        <p:nvSpPr>
+          <p:cNvPr id="13" name="Textfeld 12"/>
+          <p:cNvSpPr txBox="1"/>
+          <p:nvPr/>
+        </p:nvSpPr>
+        <p:spPr>
+          <a:xfrm>
+            <a:off x="1810172" y="1226503"/>
+            <a:ext cx="1829294" cy="646331"/>
+          </a:xfrm>
+          <a:prstGeom prst="rect">
+            <a:avLst/>
+          </a:prstGeom>
+          <a:noFill/>
+        </p:spPr>
+        <p:txBody>
+          <a:bodyPr wrap="square" lIns="72000" rIns="72000" rtlCol="0">
+            <a:spAutoFit/>
+          </a:bodyPr>
+          <a:lstStyle/>
+          <a:p>
+            <a:pPr algn="ctr"/>
+            <a:r>
+              <a:rPr lang="de-DE" smtClean="0"/>
+              <a:t>Business Analyst </a:t>
+            </a:r>
+            <a:r>
+              <a:rPr lang="de-DE" smtClean="0">
+                <a:latin typeface="+mn-lt"/>
+              </a:rPr>
+              <a:t>/</a:t>
+            </a:r>
+          </a:p>
+          <a:p>
+            <a:pPr algn="ctr"/>
+            <a:r>
+              <a:rPr lang="de-DE" smtClean="0"/>
+              <a:t>Developer</a:t>
+            </a:r>
+            <a:endParaRPr lang="de-DE" dirty="0" err="1">
+              <a:latin typeface="+mn-lt"/>
+            </a:endParaRPr>
+          </a:p>
+        </p:txBody>
+      </p:sp>
+      <p:sp>
+        <p:nvSpPr>
+          <p:cNvPr id="14" name="Flussdiagramm: Magnetplattenspeicher 13"/>
+          <p:cNvSpPr/>
+          <p:nvPr/>
+        </p:nvSpPr>
+        <p:spPr bwMode="auto">
+          <a:xfrm>
+            <a:off x="5058827" y="5133541"/>
+            <a:ext cx="1500074" cy="667942"/>
           </a:xfrm>
           <a:prstGeom prst="flowChartMagneticDisk">
             <a:avLst/>
@@ -3460,643 +4198,6 @@
           <a:p>
             <a:pPr algn="ctr"/>
             <a:r>
-              <a:rPr lang="de-DE" dirty="0" smtClean="0">
-                <a:latin typeface="+mn-lt"/>
-              </a:rPr>
-              <a:t>File Repository</a:t>
-            </a:r>
-            <a:endParaRPr lang="de-DE" dirty="0">
-              <a:latin typeface="+mn-lt"/>
-            </a:endParaRPr>
-          </a:p>
-        </p:txBody>
-      </p:sp>
-      <p:sp>
-        <p:nvSpPr>
-          <p:cNvPr id="3" name="Flussdiagramm: Prozess 2"/>
-          <p:cNvSpPr/>
-          <p:nvPr/>
-        </p:nvSpPr>
-        <p:spPr bwMode="auto">
-          <a:xfrm>
-            <a:off x="4776984" y="4139936"/>
-            <a:ext cx="1584176" cy="720080"/>
-          </a:xfrm>
-          <a:prstGeom prst="flowChartProcess">
-            <a:avLst/>
-          </a:prstGeom>
-          <a:ln>
-            <a:headEnd type="none" w="med" len="med"/>
-            <a:tailEnd type="none" w="med" len="med"/>
-          </a:ln>
-        </p:spPr>
-        <p:style>
-          <a:lnRef idx="2">
-            <a:schemeClr val="accent1"/>
-          </a:lnRef>
-          <a:fillRef idx="1">
-            <a:schemeClr val="lt1"/>
-          </a:fillRef>
-          <a:effectRef idx="0">
-            <a:schemeClr val="accent1"/>
-          </a:effectRef>
-          <a:fontRef idx="minor">
-            <a:schemeClr val="dk1"/>
-          </a:fontRef>
-        </p:style>
-        <p:txBody>
-          <a:bodyPr vert="horz" wrap="square" lIns="72000" tIns="46800" rIns="72000" bIns="46800" numCol="1" rtlCol="0" anchor="ctr" anchorCtr="0" compatLnSpc="1">
-            <a:prstTxWarp prst="textNoShape">
-              <a:avLst/>
-            </a:prstTxWarp>
-          </a:bodyPr>
-          <a:lstStyle/>
-          <a:p>
-            <a:pPr algn="ctr"/>
-            <a:r>
-              <a:rPr lang="de-DE" smtClean="0">
-                <a:solidFill>
-                  <a:schemeClr val="tx1"/>
-                </a:solidFill>
-              </a:rPr>
-              <a:t>Engine </a:t>
-            </a:r>
-          </a:p>
-          <a:p>
-            <a:pPr algn="ctr"/>
-            <a:r>
-              <a:rPr lang="de-DE" sz="1600" smtClean="0">
-                <a:solidFill>
-                  <a:schemeClr val="tx1"/>
-                </a:solidFill>
-              </a:rPr>
-              <a:t>(BPMN, CMMN)</a:t>
-            </a:r>
-            <a:endParaRPr lang="de-DE" sz="1600" dirty="0" err="1">
-              <a:solidFill>
-                <a:schemeClr val="tx1"/>
-              </a:solidFill>
-            </a:endParaRPr>
-          </a:p>
-        </p:txBody>
-      </p:sp>
-      <p:sp>
-        <p:nvSpPr>
-          <p:cNvPr id="4" name="Flussdiagramm: Prozess 3"/>
-          <p:cNvSpPr/>
-          <p:nvPr/>
-        </p:nvSpPr>
-        <p:spPr bwMode="auto">
-          <a:xfrm>
-            <a:off x="3852974" y="2195720"/>
-            <a:ext cx="1584176" cy="720080"/>
-          </a:xfrm>
-          <a:prstGeom prst="flowChartProcess">
-            <a:avLst/>
-          </a:prstGeom>
-          <a:ln>
-            <a:headEnd type="none" w="med" len="med"/>
-            <a:tailEnd type="none" w="med" len="med"/>
-          </a:ln>
-        </p:spPr>
-        <p:style>
-          <a:lnRef idx="2">
-            <a:schemeClr val="accent1"/>
-          </a:lnRef>
-          <a:fillRef idx="1">
-            <a:schemeClr val="lt1"/>
-          </a:fillRef>
-          <a:effectRef idx="0">
-            <a:schemeClr val="accent1"/>
-          </a:effectRef>
-          <a:fontRef idx="minor">
-            <a:schemeClr val="dk1"/>
-          </a:fontRef>
-        </p:style>
-        <p:txBody>
-          <a:bodyPr vert="horz" wrap="square" lIns="72000" tIns="46800" rIns="72000" bIns="46800" numCol="1" rtlCol="0" anchor="ctr" anchorCtr="0" compatLnSpc="1">
-            <a:prstTxWarp prst="textNoShape">
-              <a:avLst/>
-            </a:prstTxWarp>
-          </a:bodyPr>
-          <a:lstStyle/>
-          <a:p>
-            <a:pPr algn="ctr"/>
-            <a:r>
-              <a:rPr lang="de-DE">
-                <a:solidFill>
-                  <a:schemeClr val="tx1"/>
-                </a:solidFill>
-              </a:rPr>
-              <a:t>Tasklist</a:t>
-            </a:r>
-            <a:endParaRPr lang="de-DE" dirty="0" err="1">
-              <a:solidFill>
-                <a:schemeClr val="tx1"/>
-              </a:solidFill>
-            </a:endParaRPr>
-          </a:p>
-        </p:txBody>
-      </p:sp>
-      <p:sp>
-        <p:nvSpPr>
-          <p:cNvPr id="5" name="Flussdiagramm: Prozess 4"/>
-          <p:cNvSpPr/>
-          <p:nvPr/>
-        </p:nvSpPr>
-        <p:spPr bwMode="auto">
-          <a:xfrm>
-            <a:off x="5641080" y="2195720"/>
-            <a:ext cx="1584176" cy="720080"/>
-          </a:xfrm>
-          <a:prstGeom prst="flowChartProcess">
-            <a:avLst/>
-          </a:prstGeom>
-          <a:solidFill>
-            <a:schemeClr val="bg1"/>
-          </a:solidFill>
-          <a:ln w="9525" cap="flat" cmpd="sng" algn="ctr">
-            <a:solidFill>
-              <a:schemeClr val="tx1"/>
-            </a:solidFill>
-            <a:prstDash val="dash"/>
-            <a:round/>
-            <a:headEnd type="none" w="med" len="med"/>
-            <a:tailEnd type="none" w="med" len="med"/>
-          </a:ln>
-          <a:effectLst/>
-        </p:spPr>
-        <p:txBody>
-          <a:bodyPr vert="horz" wrap="square" lIns="72000" tIns="46800" rIns="72000" bIns="46800" numCol="1" rtlCol="0" anchor="ctr" anchorCtr="0" compatLnSpc="1">
-            <a:prstTxWarp prst="textNoShape">
-              <a:avLst/>
-            </a:prstTxWarp>
-          </a:bodyPr>
-          <a:lstStyle/>
-          <a:p>
-            <a:pPr algn="ctr"/>
-            <a:r>
-              <a:rPr lang="de-DE">
-                <a:latin typeface="+mn-lt"/>
-              </a:rPr>
-              <a:t>Custom</a:t>
-            </a:r>
-          </a:p>
-          <a:p>
-            <a:pPr algn="ctr"/>
-            <a:r>
-              <a:rPr lang="de-DE">
-                <a:latin typeface="+mn-lt"/>
-              </a:rPr>
-              <a:t>Application</a:t>
-            </a:r>
-            <a:endParaRPr lang="de-DE" dirty="0" err="1">
-              <a:latin typeface="+mn-lt"/>
-            </a:endParaRPr>
-          </a:p>
-        </p:txBody>
-      </p:sp>
-      <p:sp>
-        <p:nvSpPr>
-          <p:cNvPr id="6" name="Flussdiagramm: Prozess 5"/>
-          <p:cNvSpPr/>
-          <p:nvPr/>
-        </p:nvSpPr>
-        <p:spPr bwMode="auto">
-          <a:xfrm>
-            <a:off x="7585296" y="2186395"/>
-            <a:ext cx="1584176" cy="720080"/>
-          </a:xfrm>
-          <a:prstGeom prst="flowChartProcess">
-            <a:avLst/>
-          </a:prstGeom>
-          <a:ln>
-            <a:headEnd type="none" w="med" len="med"/>
-            <a:tailEnd type="none" w="med" len="med"/>
-          </a:ln>
-        </p:spPr>
-        <p:style>
-          <a:lnRef idx="2">
-            <a:schemeClr val="accent1"/>
-          </a:lnRef>
-          <a:fillRef idx="1">
-            <a:schemeClr val="lt1"/>
-          </a:fillRef>
-          <a:effectRef idx="0">
-            <a:schemeClr val="accent1"/>
-          </a:effectRef>
-          <a:fontRef idx="minor">
-            <a:schemeClr val="dk1"/>
-          </a:fontRef>
-        </p:style>
-        <p:txBody>
-          <a:bodyPr vert="horz" wrap="square" lIns="72000" tIns="46800" rIns="72000" bIns="46800" numCol="1" rtlCol="0" anchor="ctr" anchorCtr="0" compatLnSpc="1">
-            <a:prstTxWarp prst="textNoShape">
-              <a:avLst/>
-            </a:prstTxWarp>
-          </a:bodyPr>
-          <a:lstStyle/>
-          <a:p>
-            <a:pPr algn="ctr"/>
-            <a:r>
-              <a:rPr lang="de-DE">
-                <a:solidFill>
-                  <a:schemeClr val="tx1"/>
-                </a:solidFill>
-              </a:rPr>
-              <a:t>Cockpit</a:t>
-            </a:r>
-            <a:endParaRPr lang="de-DE" dirty="0" err="1">
-              <a:solidFill>
-                <a:schemeClr val="tx1"/>
-              </a:solidFill>
-            </a:endParaRPr>
-          </a:p>
-        </p:txBody>
-      </p:sp>
-      <p:sp>
-        <p:nvSpPr>
-          <p:cNvPr id="7" name="Flussdiagramm: Prozess 6"/>
-          <p:cNvSpPr/>
-          <p:nvPr/>
-        </p:nvSpPr>
-        <p:spPr bwMode="auto">
-          <a:xfrm>
-            <a:off x="1968672" y="3143423"/>
-            <a:ext cx="1584176" cy="720080"/>
-          </a:xfrm>
-          <a:prstGeom prst="flowChartProcess">
-            <a:avLst/>
-          </a:prstGeom>
-          <a:ln>
-            <a:headEnd type="none" w="med" len="med"/>
-            <a:tailEnd type="none" w="med" len="med"/>
-          </a:ln>
-        </p:spPr>
-        <p:style>
-          <a:lnRef idx="2">
-            <a:schemeClr val="accent1"/>
-          </a:lnRef>
-          <a:fillRef idx="1">
-            <a:schemeClr val="lt1"/>
-          </a:fillRef>
-          <a:effectRef idx="0">
-            <a:schemeClr val="accent1"/>
-          </a:effectRef>
-          <a:fontRef idx="minor">
-            <a:schemeClr val="dk1"/>
-          </a:fontRef>
-        </p:style>
-        <p:txBody>
-          <a:bodyPr vert="horz" wrap="square" lIns="72000" tIns="46800" rIns="72000" bIns="46800" numCol="1" rtlCol="0" anchor="ctr" anchorCtr="0" compatLnSpc="1">
-            <a:prstTxWarp prst="textNoShape">
-              <a:avLst/>
-            </a:prstTxWarp>
-          </a:bodyPr>
-          <a:lstStyle/>
-          <a:p>
-            <a:pPr algn="ctr"/>
-            <a:r>
-              <a:rPr lang="de-DE">
-                <a:solidFill>
-                  <a:schemeClr val="tx1"/>
-                </a:solidFill>
-              </a:rPr>
-              <a:t>Cycle</a:t>
-            </a:r>
-            <a:endParaRPr lang="de-DE" dirty="0" err="1">
-              <a:solidFill>
-                <a:schemeClr val="tx1"/>
-              </a:solidFill>
-            </a:endParaRPr>
-          </a:p>
-        </p:txBody>
-      </p:sp>
-      <p:sp>
-        <p:nvSpPr>
-          <p:cNvPr id="8" name="Flussdiagramm: Prozess 7"/>
-          <p:cNvSpPr/>
-          <p:nvPr/>
-        </p:nvSpPr>
-        <p:spPr bwMode="auto">
-          <a:xfrm>
-            <a:off x="1968672" y="5048744"/>
-            <a:ext cx="1584176" cy="720080"/>
-          </a:xfrm>
-          <a:prstGeom prst="flowChartProcess">
-            <a:avLst/>
-          </a:prstGeom>
-          <a:ln>
-            <a:headEnd type="none" w="med" len="med"/>
-            <a:tailEnd type="none" w="med" len="med"/>
-          </a:ln>
-        </p:spPr>
-        <p:style>
-          <a:lnRef idx="2">
-            <a:schemeClr val="accent1"/>
-          </a:lnRef>
-          <a:fillRef idx="1">
-            <a:schemeClr val="lt1"/>
-          </a:fillRef>
-          <a:effectRef idx="0">
-            <a:schemeClr val="accent1"/>
-          </a:effectRef>
-          <a:fontRef idx="minor">
-            <a:schemeClr val="dk1"/>
-          </a:fontRef>
-        </p:style>
-        <p:txBody>
-          <a:bodyPr vert="horz" wrap="square" lIns="72000" tIns="46800" rIns="72000" bIns="46800" numCol="1" rtlCol="0" anchor="ctr" anchorCtr="0" compatLnSpc="1">
-            <a:prstTxWarp prst="textNoShape">
-              <a:avLst/>
-            </a:prstTxWarp>
-          </a:bodyPr>
-          <a:lstStyle/>
-          <a:p>
-            <a:pPr algn="ctr"/>
-            <a:r>
-              <a:rPr lang="de-DE">
-                <a:solidFill>
-                  <a:schemeClr val="tx1"/>
-                </a:solidFill>
-              </a:rPr>
-              <a:t>Eclipse</a:t>
-            </a:r>
-          </a:p>
-          <a:p>
-            <a:pPr algn="ctr"/>
-            <a:r>
-              <a:rPr lang="de-DE">
-                <a:solidFill>
-                  <a:schemeClr val="tx1"/>
-                </a:solidFill>
-              </a:rPr>
-              <a:t>Modeler</a:t>
-            </a:r>
-            <a:endParaRPr lang="de-DE" dirty="0" err="1">
-              <a:solidFill>
-                <a:schemeClr val="tx1"/>
-              </a:solidFill>
-            </a:endParaRPr>
-          </a:p>
-        </p:txBody>
-      </p:sp>
-      <p:sp>
-        <p:nvSpPr>
-          <p:cNvPr id="9" name="Flussdiagramm: Prozess 8"/>
-          <p:cNvSpPr/>
-          <p:nvPr/>
-        </p:nvSpPr>
-        <p:spPr bwMode="auto">
-          <a:xfrm>
-            <a:off x="1968672" y="2195720"/>
-            <a:ext cx="1584176" cy="720080"/>
-          </a:xfrm>
-          <a:prstGeom prst="flowChartProcess">
-            <a:avLst/>
-          </a:prstGeom>
-          <a:solidFill>
-            <a:schemeClr val="bg1"/>
-          </a:solidFill>
-          <a:ln w="9525" cap="flat" cmpd="sng" algn="ctr">
-            <a:solidFill>
-              <a:schemeClr val="tx1"/>
-            </a:solidFill>
-            <a:prstDash val="dash"/>
-            <a:round/>
-            <a:headEnd type="none" w="med" len="med"/>
-            <a:tailEnd type="none" w="med" len="med"/>
-          </a:ln>
-          <a:effectLst/>
-        </p:spPr>
-        <p:txBody>
-          <a:bodyPr vert="horz" wrap="square" lIns="72000" tIns="46800" rIns="72000" bIns="46800" numCol="1" rtlCol="0" anchor="ctr" anchorCtr="0" compatLnSpc="1">
-            <a:prstTxWarp prst="textNoShape">
-              <a:avLst/>
-            </a:prstTxWarp>
-          </a:bodyPr>
-          <a:lstStyle/>
-          <a:p>
-            <a:pPr algn="ctr"/>
-            <a:r>
-              <a:rPr lang="de-DE" smtClean="0">
-                <a:latin typeface="+mn-lt"/>
-              </a:rPr>
-              <a:t>3rd Party</a:t>
-            </a:r>
-            <a:endParaRPr lang="de-DE">
-              <a:latin typeface="+mn-lt"/>
-            </a:endParaRPr>
-          </a:p>
-          <a:p>
-            <a:pPr algn="ctr"/>
-            <a:r>
-              <a:rPr lang="de-DE">
-                <a:latin typeface="+mn-lt"/>
-              </a:rPr>
-              <a:t>Modeler</a:t>
-            </a:r>
-            <a:endParaRPr lang="de-DE" dirty="0" err="1">
-              <a:latin typeface="+mn-lt"/>
-            </a:endParaRPr>
-          </a:p>
-        </p:txBody>
-      </p:sp>
-      <p:sp>
-        <p:nvSpPr>
-          <p:cNvPr id="10" name="Textfeld 9"/>
-          <p:cNvSpPr txBox="1"/>
-          <p:nvPr/>
-        </p:nvSpPr>
-        <p:spPr>
-          <a:xfrm>
-            <a:off x="4850187" y="1486095"/>
-            <a:ext cx="1403764" cy="286232"/>
-          </a:xfrm>
-          <a:prstGeom prst="rect">
-            <a:avLst/>
-          </a:prstGeom>
-          <a:noFill/>
-        </p:spPr>
-        <p:txBody>
-          <a:bodyPr wrap="none" lIns="72000" rIns="72000" rtlCol="0">
-            <a:spAutoFit/>
-          </a:bodyPr>
-          <a:lstStyle/>
-          <a:p>
-            <a:r>
-              <a:rPr lang="de-DE" dirty="0">
-                <a:latin typeface="+mn-lt"/>
-              </a:rPr>
-              <a:t>Business User</a:t>
-            </a:r>
-          </a:p>
-        </p:txBody>
-      </p:sp>
-      <p:sp>
-        <p:nvSpPr>
-          <p:cNvPr id="11" name="Textfeld 10"/>
-          <p:cNvSpPr txBox="1"/>
-          <p:nvPr/>
-        </p:nvSpPr>
-        <p:spPr>
-          <a:xfrm>
-            <a:off x="7585296" y="1156986"/>
-            <a:ext cx="1584176" cy="674031"/>
-          </a:xfrm>
-          <a:prstGeom prst="rect">
-            <a:avLst/>
-          </a:prstGeom>
-          <a:noFill/>
-        </p:spPr>
-        <p:txBody>
-          <a:bodyPr wrap="square" lIns="72000" rIns="72000" rtlCol="0">
-            <a:spAutoFit/>
-          </a:bodyPr>
-          <a:lstStyle/>
-          <a:p>
-            <a:pPr algn="ctr"/>
-            <a:r>
-              <a:rPr lang="de-DE" dirty="0">
-                <a:latin typeface="+mn-lt"/>
-              </a:rPr>
-              <a:t>Operations</a:t>
-            </a:r>
-          </a:p>
-          <a:p>
-            <a:pPr algn="ctr"/>
-            <a:r>
-              <a:rPr lang="de-DE" dirty="0">
-                <a:latin typeface="+mn-lt"/>
-              </a:rPr>
-              <a:t>(technical</a:t>
-            </a:r>
-          </a:p>
-          <a:p>
-            <a:pPr algn="ctr"/>
-            <a:r>
-              <a:rPr lang="de-DE" dirty="0">
-                <a:latin typeface="+mn-lt"/>
-              </a:rPr>
-              <a:t>/business)</a:t>
-            </a:r>
-          </a:p>
-        </p:txBody>
-      </p:sp>
-      <p:sp>
-        <p:nvSpPr>
-          <p:cNvPr id="12" name="Textfeld 11"/>
-          <p:cNvSpPr txBox="1"/>
-          <p:nvPr/>
-        </p:nvSpPr>
-        <p:spPr>
-          <a:xfrm>
-            <a:off x="814282" y="2312994"/>
-            <a:ext cx="932481" cy="480131"/>
-          </a:xfrm>
-          <a:prstGeom prst="rect">
-            <a:avLst/>
-          </a:prstGeom>
-          <a:noFill/>
-        </p:spPr>
-        <p:txBody>
-          <a:bodyPr wrap="none" lIns="72000" rIns="72000" rtlCol="0">
-            <a:spAutoFit/>
-          </a:bodyPr>
-          <a:lstStyle/>
-          <a:p>
-            <a:pPr algn="ctr"/>
-            <a:r>
-              <a:rPr lang="de-DE" dirty="0">
-                <a:latin typeface="+mn-lt"/>
-              </a:rPr>
-              <a:t>Business</a:t>
-            </a:r>
-          </a:p>
-          <a:p>
-            <a:pPr algn="ctr"/>
-            <a:r>
-              <a:rPr lang="de-DE" dirty="0">
-                <a:latin typeface="+mn-lt"/>
-              </a:rPr>
-              <a:t>Analyst</a:t>
-            </a:r>
-          </a:p>
-        </p:txBody>
-      </p:sp>
-      <p:sp>
-        <p:nvSpPr>
-          <p:cNvPr id="13" name="Textfeld 12"/>
-          <p:cNvSpPr txBox="1"/>
-          <p:nvPr/>
-        </p:nvSpPr>
-        <p:spPr>
-          <a:xfrm>
-            <a:off x="751764" y="5265668"/>
-            <a:ext cx="1057515" cy="286232"/>
-          </a:xfrm>
-          <a:prstGeom prst="rect">
-            <a:avLst/>
-          </a:prstGeom>
-          <a:noFill/>
-        </p:spPr>
-        <p:txBody>
-          <a:bodyPr wrap="none" lIns="72000" rIns="72000" rtlCol="0">
-            <a:spAutoFit/>
-          </a:bodyPr>
-          <a:lstStyle/>
-          <a:p>
-            <a:pPr algn="ctr"/>
-            <a:r>
-              <a:rPr lang="de-DE">
-                <a:latin typeface="+mn-lt"/>
-              </a:rPr>
-              <a:t>Developer</a:t>
-            </a:r>
-            <a:endParaRPr lang="de-DE" dirty="0" err="1">
-              <a:latin typeface="+mn-lt"/>
-            </a:endParaRPr>
-          </a:p>
-        </p:txBody>
-      </p:sp>
-      <p:sp>
-        <p:nvSpPr>
-          <p:cNvPr id="14" name="Flussdiagramm: Magnetplattenspeicher 13"/>
-          <p:cNvSpPr/>
-          <p:nvPr/>
-        </p:nvSpPr>
-        <p:spPr bwMode="auto">
-          <a:xfrm>
-            <a:off x="4819035" y="5148048"/>
-            <a:ext cx="1500074" cy="667942"/>
-          </a:xfrm>
-          <a:prstGeom prst="flowChartMagneticDisk">
-            <a:avLst/>
-          </a:prstGeom>
-          <a:solidFill>
-            <a:schemeClr val="bg1"/>
-          </a:solidFill>
-          <a:ln w="9525" cap="flat" cmpd="sng" algn="ctr">
-            <a:solidFill>
-              <a:schemeClr val="tx1"/>
-            </a:solidFill>
-            <a:prstDash val="dash"/>
-            <a:round/>
-            <a:headEnd type="none" w="med" len="med"/>
-            <a:tailEnd type="none" w="med" len="med"/>
-          </a:ln>
-          <a:effectLst/>
-        </p:spPr>
-        <p:txBody>
-          <a:bodyPr vert="horz" wrap="square" lIns="72000" tIns="46800" rIns="72000" bIns="46800" numCol="1" rtlCol="0" anchor="ctr" anchorCtr="0" compatLnSpc="1">
-            <a:prstTxWarp prst="textNoShape">
-              <a:avLst/>
-            </a:prstTxWarp>
-          </a:bodyPr>
-          <a:lstStyle/>
-          <a:p>
-            <a:pPr algn="ctr"/>
-            <a:r>
               <a:rPr lang="de-DE">
                 <a:latin typeface="+mn-lt"/>
               </a:rPr>
@@ -4118,9 +4219,9 @@
           <p:nvPr/>
         </p:nvCxnSpPr>
         <p:spPr>
-          <a:xfrm>
-            <a:off x="5569072" y="4860016"/>
-            <a:ext cx="0" cy="288032"/>
+          <a:xfrm flipH="1">
+            <a:off x="5808864" y="4860016"/>
+            <a:ext cx="1" cy="273525"/>
           </a:xfrm>
           <a:prstGeom prst="line">
             <a:avLst/>
@@ -4157,8 +4258,8 @@
         </p:nvCxnSpPr>
         <p:spPr>
           <a:xfrm rot="16200000" flipH="1">
-            <a:off x="4494999" y="3065863"/>
-            <a:ext cx="1224136" cy="924010"/>
+            <a:off x="4614895" y="2945966"/>
+            <a:ext cx="1224136" cy="1163803"/>
           </a:xfrm>
           <a:prstGeom prst="bentConnector3">
             <a:avLst>
@@ -4189,15 +4290,18 @@
       <p:cxnSp>
         <p:nvCxnSpPr>
           <p:cNvPr id="18" name="Gerade Verbindung 20"/>
-          <p:cNvCxnSpPr/>
+          <p:cNvCxnSpPr>
+            <a:stCxn id="8" idx="2"/>
+            <a:endCxn id="3" idx="1"/>
+          </p:cNvCxnSpPr>
           <p:nvPr/>
         </p:nvCxnSpPr>
         <p:spPr>
-          <a:xfrm flipV="1">
-            <a:off x="3528000" y="4499977"/>
-            <a:ext cx="1224000" cy="1"/>
-          </a:xfrm>
-          <a:prstGeom prst="straightConnector1">
+          <a:xfrm rot="16200000" flipH="1">
+            <a:off x="2957463" y="2680455"/>
+            <a:ext cx="1586877" cy="2052164"/>
+          </a:xfrm>
+          <a:prstGeom prst="bentConnector2">
             <a:avLst/>
           </a:prstGeom>
           <a:ln>
@@ -4232,8 +4336,8 @@
         </p:nvCxnSpPr>
         <p:spPr>
           <a:xfrm rot="5400000">
-            <a:off x="5389052" y="3095820"/>
-            <a:ext cx="1224136" cy="864096"/>
+            <a:off x="5508949" y="3215717"/>
+            <a:ext cx="1224136" cy="624303"/>
           </a:xfrm>
           <a:prstGeom prst="bentConnector3">
             <a:avLst>
@@ -4272,235 +4376,8 @@
         </p:nvCxnSpPr>
         <p:spPr>
           <a:xfrm flipV="1">
-            <a:off x="6361162" y="2906475"/>
-            <a:ext cx="2016223" cy="1010152"/>
-          </a:xfrm>
-          <a:prstGeom prst="bentConnector2">
-            <a:avLst/>
-          </a:prstGeom>
-          <a:ln>
-            <a:solidFill>
-              <a:schemeClr val="tx1"/>
-            </a:solidFill>
-          </a:ln>
-        </p:spPr>
-        <p:style>
-          <a:lnRef idx="1">
-            <a:schemeClr val="accent1"/>
-          </a:lnRef>
-          <a:fillRef idx="0">
-            <a:schemeClr val="accent1"/>
-          </a:fillRef>
-          <a:effectRef idx="0">
-            <a:schemeClr val="accent1"/>
-          </a:effectRef>
-          <a:fontRef idx="minor">
-            <a:schemeClr val="tx1"/>
-          </a:fontRef>
-        </p:style>
-      </p:cxnSp>
-      <p:cxnSp>
-        <p:nvCxnSpPr>
-          <p:cNvPr id="21" name="Gerade Verbindung 26"/>
-          <p:cNvCxnSpPr>
-            <a:stCxn id="9" idx="2"/>
-            <a:endCxn id="7" idx="0"/>
-          </p:cNvCxnSpPr>
-          <p:nvPr/>
-        </p:nvCxnSpPr>
-        <p:spPr>
-          <a:xfrm>
-            <a:off x="2760760" y="2915801"/>
-            <a:ext cx="0" cy="227623"/>
-          </a:xfrm>
-          <a:prstGeom prst="line">
-            <a:avLst/>
-          </a:prstGeom>
-          <a:ln>
-            <a:solidFill>
-              <a:schemeClr val="tx1"/>
-            </a:solidFill>
-          </a:ln>
-        </p:spPr>
-        <p:style>
-          <a:lnRef idx="1">
-            <a:schemeClr val="accent1"/>
-          </a:lnRef>
-          <a:fillRef idx="0">
-            <a:schemeClr val="accent1"/>
-          </a:fillRef>
-          <a:effectRef idx="0">
-            <a:schemeClr val="accent1"/>
-          </a:effectRef>
-          <a:fontRef idx="minor">
-            <a:schemeClr val="tx1"/>
-          </a:fontRef>
-        </p:style>
-      </p:cxnSp>
-      <p:cxnSp>
-        <p:nvCxnSpPr>
-          <p:cNvPr id="22" name="Gerade Verbindung 28"/>
-          <p:cNvCxnSpPr>
-            <a:stCxn id="7" idx="2"/>
-          </p:cNvCxnSpPr>
-          <p:nvPr/>
-        </p:nvCxnSpPr>
-        <p:spPr>
-          <a:xfrm>
-            <a:off x="2760760" y="3863503"/>
-            <a:ext cx="0" cy="246512"/>
-          </a:xfrm>
-          <a:prstGeom prst="line">
-            <a:avLst/>
-          </a:prstGeom>
-          <a:ln>
-            <a:solidFill>
-              <a:schemeClr val="tx1"/>
-            </a:solidFill>
-          </a:ln>
-        </p:spPr>
-        <p:style>
-          <a:lnRef idx="1">
-            <a:schemeClr val="accent1"/>
-          </a:lnRef>
-          <a:fillRef idx="0">
-            <a:schemeClr val="accent1"/>
-          </a:fillRef>
-          <a:effectRef idx="0">
-            <a:schemeClr val="accent1"/>
-          </a:effectRef>
-          <a:fontRef idx="minor">
-            <a:schemeClr val="tx1"/>
-          </a:fontRef>
-        </p:style>
-      </p:cxnSp>
-      <p:cxnSp>
-        <p:nvCxnSpPr>
-          <p:cNvPr id="23" name="Gerade Verbindung 30"/>
-          <p:cNvCxnSpPr>
-            <a:endCxn id="8" idx="0"/>
-          </p:cNvCxnSpPr>
-          <p:nvPr/>
-        </p:nvCxnSpPr>
-        <p:spPr>
-          <a:xfrm>
-            <a:off x="2760760" y="4788008"/>
-            <a:ext cx="0" cy="260736"/>
-          </a:xfrm>
-          <a:prstGeom prst="line">
-            <a:avLst/>
-          </a:prstGeom>
-          <a:ln>
-            <a:solidFill>
-              <a:schemeClr val="tx1"/>
-            </a:solidFill>
-          </a:ln>
-        </p:spPr>
-        <p:style>
-          <a:lnRef idx="1">
-            <a:schemeClr val="accent1"/>
-          </a:lnRef>
-          <a:fillRef idx="0">
-            <a:schemeClr val="accent1"/>
-          </a:fillRef>
-          <a:effectRef idx="0">
-            <a:schemeClr val="accent1"/>
-          </a:effectRef>
-          <a:fontRef idx="minor">
-            <a:schemeClr val="tx1"/>
-          </a:fontRef>
-        </p:style>
-      </p:cxnSp>
-      <p:cxnSp>
-        <p:nvCxnSpPr>
-          <p:cNvPr id="24" name="Gerade Verbindung 35"/>
-          <p:cNvCxnSpPr>
-            <a:stCxn id="12" idx="3"/>
-            <a:endCxn id="9" idx="1"/>
-          </p:cNvCxnSpPr>
-          <p:nvPr/>
-        </p:nvCxnSpPr>
-        <p:spPr>
-          <a:xfrm>
-            <a:off x="1746762" y="2553060"/>
-            <a:ext cx="221910" cy="2701"/>
-          </a:xfrm>
-          <a:prstGeom prst="line">
-            <a:avLst/>
-          </a:prstGeom>
-          <a:ln>
-            <a:solidFill>
-              <a:schemeClr val="tx1"/>
-            </a:solidFill>
-          </a:ln>
-        </p:spPr>
-        <p:style>
-          <a:lnRef idx="1">
-            <a:schemeClr val="accent1"/>
-          </a:lnRef>
-          <a:fillRef idx="0">
-            <a:schemeClr val="accent1"/>
-          </a:fillRef>
-          <a:effectRef idx="0">
-            <a:schemeClr val="accent1"/>
-          </a:effectRef>
-          <a:fontRef idx="minor">
-            <a:schemeClr val="tx1"/>
-          </a:fontRef>
-        </p:style>
-      </p:cxnSp>
-      <p:cxnSp>
-        <p:nvCxnSpPr>
-          <p:cNvPr id="25" name="Gerade Verbindung 37"/>
-          <p:cNvCxnSpPr>
-            <a:endCxn id="7" idx="1"/>
-          </p:cNvCxnSpPr>
-          <p:nvPr/>
-        </p:nvCxnSpPr>
-        <p:spPr>
-          <a:xfrm>
-            <a:off x="1280524" y="2913101"/>
-            <a:ext cx="688148" cy="590362"/>
-          </a:xfrm>
-          <a:prstGeom prst="bentConnector3">
-            <a:avLst>
-              <a:gd name="adj1" fmla="val -278"/>
-            </a:avLst>
-          </a:prstGeom>
-          <a:ln>
-            <a:solidFill>
-              <a:schemeClr val="tx1"/>
-            </a:solidFill>
-          </a:ln>
-        </p:spPr>
-        <p:style>
-          <a:lnRef idx="1">
-            <a:schemeClr val="accent1"/>
-          </a:lnRef>
-          <a:fillRef idx="0">
-            <a:schemeClr val="accent1"/>
-          </a:fillRef>
-          <a:effectRef idx="0">
-            <a:schemeClr val="accent1"/>
-          </a:effectRef>
-          <a:fontRef idx="minor">
-            <a:schemeClr val="tx1"/>
-          </a:fontRef>
-        </p:style>
-      </p:cxnSp>
-      <p:cxnSp>
-        <p:nvCxnSpPr>
-          <p:cNvPr id="26" name="Gerade Verbindung 39"/>
-          <p:cNvCxnSpPr>
-            <a:stCxn id="13" idx="0"/>
-            <a:endCxn id="7" idx="1"/>
-          </p:cNvCxnSpPr>
-          <p:nvPr/>
-        </p:nvCxnSpPr>
-        <p:spPr>
-          <a:xfrm rot="5400000" flipH="1" flipV="1">
-            <a:off x="743495" y="4040492"/>
-            <a:ext cx="1762205" cy="688151"/>
+            <a:off x="6840745" y="2906475"/>
+            <a:ext cx="1536639" cy="1010152"/>
           </a:xfrm>
           <a:prstGeom prst="bentConnector2">
             <a:avLst/>
@@ -4530,15 +4407,15 @@
         <p:nvCxnSpPr>
           <p:cNvPr id="27" name="Gerade Verbindung 41"/>
           <p:cNvCxnSpPr>
-            <a:stCxn id="13" idx="3"/>
-            <a:endCxn id="8" idx="1"/>
+            <a:stCxn id="13" idx="2"/>
+            <a:endCxn id="8" idx="0"/>
           </p:cNvCxnSpPr>
           <p:nvPr/>
         </p:nvCxnSpPr>
         <p:spPr>
           <a:xfrm>
-            <a:off x="1809278" y="5408784"/>
-            <a:ext cx="159394" cy="0"/>
+            <a:off x="2724819" y="1872834"/>
+            <a:ext cx="0" cy="313561"/>
           </a:xfrm>
           <a:prstGeom prst="line">
             <a:avLst/>
@@ -4575,8 +4452,8 @@
         </p:nvCxnSpPr>
         <p:spPr>
           <a:xfrm rot="5400000">
-            <a:off x="4886871" y="1530521"/>
-            <a:ext cx="423393" cy="907007"/>
+            <a:off x="4905676" y="1594416"/>
+            <a:ext cx="340691" cy="861917"/>
           </a:xfrm>
           <a:prstGeom prst="bentConnector3">
             <a:avLst>
@@ -4615,8 +4492,8 @@
         </p:nvCxnSpPr>
         <p:spPr>
           <a:xfrm rot="16200000" flipH="1">
-            <a:off x="5780923" y="1543474"/>
-            <a:ext cx="423393" cy="881099"/>
+            <a:off x="5799728" y="1562279"/>
+            <a:ext cx="340691" cy="926189"/>
           </a:xfrm>
           <a:prstGeom prst="bentConnector3">
             <a:avLst>
@@ -4648,14 +4525,15 @@
         <p:nvCxnSpPr>
           <p:cNvPr id="30" name="Gerade Verbindung 47"/>
           <p:cNvCxnSpPr>
+            <a:stCxn id="11" idx="2"/>
             <a:endCxn id="6" idx="0"/>
           </p:cNvCxnSpPr>
           <p:nvPr/>
         </p:nvCxnSpPr>
         <p:spPr>
-          <a:xfrm flipH="1">
-            <a:off x="8377384" y="2002055"/>
-            <a:ext cx="1" cy="184340"/>
+          <a:xfrm>
+            <a:off x="8377384" y="1855733"/>
+            <a:ext cx="0" cy="330662"/>
           </a:xfrm>
           <a:prstGeom prst="line">
             <a:avLst/>
@@ -4689,8 +4567,8 @@
         </p:nvSpPr>
         <p:spPr bwMode="auto">
           <a:xfrm>
-            <a:off x="4776985" y="3693317"/>
-            <a:ext cx="1584176" cy="446620"/>
+            <a:off x="4776984" y="3693317"/>
+            <a:ext cx="2063761" cy="446620"/>
           </a:xfrm>
           <a:prstGeom prst="flowChartProcess">
             <a:avLst/>
@@ -4868,8 +4746,8 @@
         </p:nvSpPr>
         <p:spPr bwMode="auto">
           <a:xfrm>
-            <a:off x="1110935" y="5940136"/>
-            <a:ext cx="2880320" cy="648072"/>
+            <a:off x="1804061" y="5940136"/>
+            <a:ext cx="2187194" cy="648072"/>
           </a:xfrm>
           <a:prstGeom prst="homePlate">
             <a:avLst/>
@@ -4903,12 +4781,12 @@
           <a:p>
             <a:pPr algn="ctr"/>
             <a:r>
-              <a:rPr lang="de-DE">
+              <a:rPr lang="de-DE" smtClean="0">
                 <a:solidFill>
                   <a:schemeClr val="bg1"/>
                 </a:solidFill>
               </a:rPr>
-              <a:t>Design Time</a:t>
+              <a:t>Model</a:t>
             </a:r>
             <a:endParaRPr lang="de-DE" dirty="0" err="1">
               <a:solidFill>
@@ -4927,7 +4805,7 @@
         <p:spPr bwMode="auto">
           <a:xfrm>
             <a:off x="3780966" y="5940136"/>
-            <a:ext cx="7332376" cy="648072"/>
+            <a:ext cx="7460392" cy="648072"/>
           </a:xfrm>
           <a:prstGeom prst="chevron">
             <a:avLst/>
@@ -4961,12 +4839,12 @@
           <a:p>
             <a:pPr algn="ctr"/>
             <a:r>
-              <a:rPr lang="de-DE">
+              <a:rPr lang="de-DE" smtClean="0">
                 <a:solidFill>
                   <a:schemeClr val="bg1"/>
                 </a:solidFill>
               </a:rPr>
-              <a:t>Runtime</a:t>
+              <a:t>Execute</a:t>
             </a:r>
             <a:endParaRPr lang="de-DE" dirty="0" err="1">
               <a:solidFill>
@@ -5045,8 +4923,8 @@
         </p:nvCxnSpPr>
         <p:spPr>
           <a:xfrm flipV="1">
-            <a:off x="6361161" y="2913099"/>
-            <a:ext cx="3960438" cy="1003528"/>
+            <a:off x="6840745" y="2913099"/>
+            <a:ext cx="3480854" cy="1003528"/>
           </a:xfrm>
           <a:prstGeom prst="bentConnector2">
             <a:avLst/>
@@ -5232,21 +5110,70 @@
           </a:p>
         </p:txBody>
       </p:sp>
+      <p:sp>
+        <p:nvSpPr>
+          <p:cNvPr id="72" name="Flussdiagramm: Magnetplattenspeicher 71"/>
+          <p:cNvSpPr/>
+          <p:nvPr/>
+        </p:nvSpPr>
+        <p:spPr bwMode="auto">
+          <a:xfrm>
+            <a:off x="2010723" y="4211946"/>
+            <a:ext cx="1500074" cy="576063"/>
+          </a:xfrm>
+          <a:prstGeom prst="flowChartMagneticDisk">
+            <a:avLst/>
+          </a:prstGeom>
+          <a:solidFill>
+            <a:schemeClr val="bg1"/>
+          </a:solidFill>
+          <a:ln w="9525" cap="flat" cmpd="sng" algn="ctr">
+            <a:solidFill>
+              <a:schemeClr val="tx1"/>
+            </a:solidFill>
+            <a:prstDash val="dash"/>
+            <a:round/>
+            <a:headEnd type="none" w="med" len="med"/>
+            <a:tailEnd type="none" w="med" len="med"/>
+          </a:ln>
+          <a:effectLst/>
+        </p:spPr>
+        <p:txBody>
+          <a:bodyPr vert="horz" wrap="square" lIns="72000" tIns="46800" rIns="72000" bIns="46800" numCol="1" rtlCol="0" anchor="ctr" anchorCtr="0" compatLnSpc="1">
+            <a:prstTxWarp prst="textNoShape">
+              <a:avLst/>
+            </a:prstTxWarp>
+          </a:bodyPr>
+          <a:lstStyle/>
+          <a:p>
+            <a:pPr algn="ctr"/>
+            <a:r>
+              <a:rPr lang="de-DE" sz="1600">
+                <a:latin typeface="+mn-lt"/>
+              </a:rPr>
+              <a:t>File Repository</a:t>
+            </a:r>
+            <a:endParaRPr lang="de-DE" sz="1600" dirty="0" err="1">
+              <a:latin typeface="+mn-lt"/>
+            </a:endParaRPr>
+          </a:p>
+        </p:txBody>
+      </p:sp>
     </p:spTree>
     <p:extLst>
       <p:ext uri="{BB962C8B-B14F-4D97-AF65-F5344CB8AC3E}">
-        <p14:creationId xmlns:p14="http://schemas.microsoft.com/office/powerpoint/2010/main" val="2903113919"/>
+        <p14:creationId xmlns:p14="http://schemas.microsoft.com/office/powerpoint/2010/main" val="950952713"/>
       </p:ext>
     </p:extLst>
   </p:cSld>
   <p:clrMapOvr>
     <a:masterClrMapping/>
   </p:clrMapOvr>
-  <mc:AlternateContent xmlns:mc="http://schemas.openxmlformats.org/markup-compatibility/2006" xmlns:p14="http://schemas.microsoft.com/office/powerpoint/2010/main">
-    <mc:Choice Requires="p14">
+  <mc:AlternateContent xmlns:mc="http://schemas.openxmlformats.org/markup-compatibility/2006">
+    <mc:Choice xmlns:p14="http://schemas.microsoft.com/office/powerpoint/2010/main" Requires="p14">
       <p:transition spd="slow" p14:dur="2000"/>
     </mc:Choice>
-    <mc:Fallback xmlns="">
+    <mc:Fallback>
       <p:transition spd="slow"/>
     </mc:Fallback>
   </mc:AlternateContent>

</xml_diff>

<commit_message>
chore(introduction): update architecture overview
related to #CAM-4807
</commit_message>
<xml_diff>
--- a/develop/drawings/Technical Architecture.pptx
+++ b/develop/drawings/Technical Architecture.pptx
@@ -5065,53 +5065,6 @@
       </p:cxnSp>
       <p:sp>
         <p:nvSpPr>
-          <p:cNvPr id="50" name="Flussdiagramm: Prozess 49"/>
-          <p:cNvSpPr/>
-          <p:nvPr/>
-        </p:nvSpPr>
-        <p:spPr bwMode="auto">
-          <a:xfrm>
-            <a:off x="3774757" y="2111724"/>
-            <a:ext cx="7466601" cy="2834807"/>
-          </a:xfrm>
-          <a:prstGeom prst="flowChartProcess">
-            <a:avLst/>
-          </a:prstGeom>
-          <a:noFill/>
-          <a:ln w="9525" cap="flat" cmpd="sng" algn="ctr">
-            <a:solidFill>
-              <a:schemeClr val="tx1"/>
-            </a:solidFill>
-            <a:prstDash val="dash"/>
-            <a:round/>
-            <a:headEnd type="none" w="med" len="med"/>
-            <a:tailEnd type="none" w="med" len="med"/>
-          </a:ln>
-          <a:effectLst/>
-        </p:spPr>
-        <p:txBody>
-          <a:bodyPr vert="horz" wrap="square" lIns="72000" tIns="46800" rIns="72000" bIns="46800" numCol="1" rtlCol="0" anchor="b" anchorCtr="0" compatLnSpc="1">
-            <a:prstTxWarp prst="textNoShape">
-              <a:avLst/>
-            </a:prstTxWarp>
-          </a:bodyPr>
-          <a:lstStyle/>
-          <a:p>
-            <a:pPr algn="r"/>
-            <a:r>
-              <a:rPr lang="de-DE" smtClean="0">
-                <a:latin typeface="+mn-lt"/>
-              </a:rPr>
-              <a:t>Runtime Container</a:t>
-            </a:r>
-            <a:endParaRPr lang="de-DE" dirty="0" err="1">
-              <a:latin typeface="+mn-lt"/>
-            </a:endParaRPr>
-          </a:p>
-        </p:txBody>
-      </p:sp>
-      <p:sp>
-        <p:nvSpPr>
           <p:cNvPr id="72" name="Flussdiagramm: Magnetplattenspeicher 71"/>
           <p:cNvSpPr/>
           <p:nvPr/>
@@ -5169,11 +5122,11 @@
   <p:clrMapOvr>
     <a:masterClrMapping/>
   </p:clrMapOvr>
-  <mc:AlternateContent xmlns:mc="http://schemas.openxmlformats.org/markup-compatibility/2006">
-    <mc:Choice xmlns:p14="http://schemas.microsoft.com/office/powerpoint/2010/main" Requires="p14">
+  <mc:AlternateContent xmlns:mc="http://schemas.openxmlformats.org/markup-compatibility/2006" xmlns:p14="http://schemas.microsoft.com/office/powerpoint/2010/main">
+    <mc:Choice Requires="p14">
       <p:transition spd="slow" p14:dur="2000"/>
     </mc:Choice>
-    <mc:Fallback>
+    <mc:Fallback xmlns="">
       <p:transition spd="slow"/>
     </mc:Fallback>
   </mc:AlternateContent>

</xml_diff>